<commit_message>
Addedd Java Notes Doc
</commit_message>
<xml_diff>
--- a/Theory Class-Notes/Java MCA-2.pptx
+++ b/Theory Class-Notes/Java MCA-2.pptx
@@ -337,7 +337,7 @@
           <a:p>
             <a:fld id="{A96D8E49-6906-44F2-ABD2-E9501E5C67F3}" type="datetimeFigureOut">
               <a:rPr lang="en-IN" smtClean="0"/>
-              <a:t>24-07-2024</a:t>
+              <a:t>27-07-2024</a:t>
             </a:fld>
             <a:endParaRPr lang="en-IN"/>
           </a:p>
@@ -537,7 +537,7 @@
           <a:p>
             <a:fld id="{A96D8E49-6906-44F2-ABD2-E9501E5C67F3}" type="datetimeFigureOut">
               <a:rPr lang="en-IN" smtClean="0"/>
-              <a:t>24-07-2024</a:t>
+              <a:t>27-07-2024</a:t>
             </a:fld>
             <a:endParaRPr lang="en-IN"/>
           </a:p>
@@ -747,7 +747,7 @@
           <a:p>
             <a:fld id="{A96D8E49-6906-44F2-ABD2-E9501E5C67F3}" type="datetimeFigureOut">
               <a:rPr lang="en-IN" smtClean="0"/>
-              <a:t>24-07-2024</a:t>
+              <a:t>27-07-2024</a:t>
             </a:fld>
             <a:endParaRPr lang="en-IN"/>
           </a:p>
@@ -947,7 +947,7 @@
           <a:p>
             <a:fld id="{A96D8E49-6906-44F2-ABD2-E9501E5C67F3}" type="datetimeFigureOut">
               <a:rPr lang="en-IN" smtClean="0"/>
-              <a:t>24-07-2024</a:t>
+              <a:t>27-07-2024</a:t>
             </a:fld>
             <a:endParaRPr lang="en-IN"/>
           </a:p>
@@ -1223,7 +1223,7 @@
           <a:p>
             <a:fld id="{A96D8E49-6906-44F2-ABD2-E9501E5C67F3}" type="datetimeFigureOut">
               <a:rPr lang="en-IN" smtClean="0"/>
-              <a:t>24-07-2024</a:t>
+              <a:t>27-07-2024</a:t>
             </a:fld>
             <a:endParaRPr lang="en-IN"/>
           </a:p>
@@ -1491,7 +1491,7 @@
           <a:p>
             <a:fld id="{A96D8E49-6906-44F2-ABD2-E9501E5C67F3}" type="datetimeFigureOut">
               <a:rPr lang="en-IN" smtClean="0"/>
-              <a:t>24-07-2024</a:t>
+              <a:t>27-07-2024</a:t>
             </a:fld>
             <a:endParaRPr lang="en-IN"/>
           </a:p>
@@ -1906,7 +1906,7 @@
           <a:p>
             <a:fld id="{A96D8E49-6906-44F2-ABD2-E9501E5C67F3}" type="datetimeFigureOut">
               <a:rPr lang="en-IN" smtClean="0"/>
-              <a:t>24-07-2024</a:t>
+              <a:t>27-07-2024</a:t>
             </a:fld>
             <a:endParaRPr lang="en-IN"/>
           </a:p>
@@ -2048,7 +2048,7 @@
           <a:p>
             <a:fld id="{A96D8E49-6906-44F2-ABD2-E9501E5C67F3}" type="datetimeFigureOut">
               <a:rPr lang="en-IN" smtClean="0"/>
-              <a:t>24-07-2024</a:t>
+              <a:t>27-07-2024</a:t>
             </a:fld>
             <a:endParaRPr lang="en-IN"/>
           </a:p>
@@ -2161,7 +2161,7 @@
           <a:p>
             <a:fld id="{A96D8E49-6906-44F2-ABD2-E9501E5C67F3}" type="datetimeFigureOut">
               <a:rPr lang="en-IN" smtClean="0"/>
-              <a:t>24-07-2024</a:t>
+              <a:t>27-07-2024</a:t>
             </a:fld>
             <a:endParaRPr lang="en-IN"/>
           </a:p>
@@ -2474,7 +2474,7 @@
           <a:p>
             <a:fld id="{A96D8E49-6906-44F2-ABD2-E9501E5C67F3}" type="datetimeFigureOut">
               <a:rPr lang="en-IN" smtClean="0"/>
-              <a:t>24-07-2024</a:t>
+              <a:t>27-07-2024</a:t>
             </a:fld>
             <a:endParaRPr lang="en-IN"/>
           </a:p>
@@ -2763,7 +2763,7 @@
           <a:p>
             <a:fld id="{A96D8E49-6906-44F2-ABD2-E9501E5C67F3}" type="datetimeFigureOut">
               <a:rPr lang="en-IN" smtClean="0"/>
-              <a:t>24-07-2024</a:t>
+              <a:t>27-07-2024</a:t>
             </a:fld>
             <a:endParaRPr lang="en-IN"/>
           </a:p>
@@ -3006,7 +3006,7 @@
           <a:p>
             <a:fld id="{A96D8E49-6906-44F2-ABD2-E9501E5C67F3}" type="datetimeFigureOut">
               <a:rPr lang="en-IN" smtClean="0"/>
-              <a:t>24-07-2024</a:t>
+              <a:t>27-07-2024</a:t>
             </a:fld>
             <a:endParaRPr lang="en-IN"/>
           </a:p>
@@ -10717,7 +10717,7 @@
           <p:nvPr>
             <p:extLst>
               <p:ext uri="{D42A27DB-BD31-4B8C-83A1-F6EECF244321}">
-                <p14:modId xmlns:p14="http://schemas.microsoft.com/office/powerpoint/2010/main" val="4178911266"/>
+                <p14:modId xmlns:p14="http://schemas.microsoft.com/office/powerpoint/2010/main" val="2701927688"/>
               </p:ext>
             </p:extLst>
           </p:nvPr>
@@ -16516,7 +16516,9 @@
             <a:r>
               <a:rPr lang="en-IN" b="1" dirty="0">
                 <a:solidFill>
-                  <a:srgbClr val="C00000"/>
+                  <a:schemeClr val="accent6">
+                    <a:lumMod val="50000"/>
+                  </a:schemeClr>
                 </a:solidFill>
               </a:rPr>
               <a:t>1. if statement</a:t>
@@ -16524,7 +16526,9 @@
             <a:r>
               <a:rPr lang="en-IN" dirty="0">
                 <a:solidFill>
-                  <a:srgbClr val="C00000"/>
+                  <a:schemeClr val="accent6">
+                    <a:lumMod val="50000"/>
+                  </a:schemeClr>
                 </a:solidFill>
               </a:rPr>
               <a:t>:</a:t>
@@ -16544,7 +16548,19 @@
             </a:r>
             <a:r>
               <a:rPr lang="en-US" sz="2400" dirty="0"/>
-              <a:t>(a Boolean expression). If the condition is </a:t>
+              <a:t>(a </a:t>
+            </a:r>
+            <a:r>
+              <a:rPr lang="en-US" sz="2400" b="1" dirty="0">
+                <a:solidFill>
+                  <a:srgbClr val="C00000"/>
+                </a:solidFill>
+              </a:rPr>
+              <a:t>Boolean expression</a:t>
+            </a:r>
+            <a:r>
+              <a:rPr lang="en-US" sz="2400" dirty="0"/>
+              <a:t>). If the condition is </a:t>
             </a:r>
             <a:r>
               <a:rPr lang="en-US" sz="2400" b="1" dirty="0"/>
@@ -16740,11 +16756,23 @@
               <a:buNone/>
             </a:pPr>
             <a:r>
-              <a:rPr lang="en-IN" b="1" dirty="0"/>
+              <a:rPr lang="en-IN" b="1" dirty="0">
+                <a:solidFill>
+                  <a:schemeClr val="accent6">
+                    <a:lumMod val="50000"/>
+                  </a:schemeClr>
+                </a:solidFill>
+              </a:rPr>
               <a:t>2. if-else statement</a:t>
             </a:r>
             <a:r>
-              <a:rPr lang="en-IN" dirty="0"/>
+              <a:rPr lang="en-IN" dirty="0">
+                <a:solidFill>
+                  <a:schemeClr val="accent6">
+                    <a:lumMod val="50000"/>
+                  </a:schemeClr>
+                </a:solidFill>
+              </a:rPr>
               <a:t>:</a:t>
             </a:r>
           </a:p>
@@ -16754,7 +16782,35 @@
             </a:pPr>
             <a:r>
               <a:rPr lang="en-US" sz="2400" dirty="0"/>
-              <a:t>Explanation: The if-else statement provides two blocks of code: one that executes if the condition is true and another that executes if the condition is false.</a:t>
+              <a:t>The if-else statement provides </a:t>
+            </a:r>
+            <a:r>
+              <a:rPr lang="en-US" sz="2400" b="1" dirty="0">
+                <a:solidFill>
+                  <a:srgbClr val="C00000"/>
+                </a:solidFill>
+              </a:rPr>
+              <a:t>two blocks of code</a:t>
+            </a:r>
+            <a:r>
+              <a:rPr lang="en-US" sz="2400" dirty="0"/>
+              <a:t>: one that executes if the condition is </a:t>
+            </a:r>
+            <a:r>
+              <a:rPr lang="en-US" sz="2400" b="1" dirty="0"/>
+              <a:t>true</a:t>
+            </a:r>
+            <a:r>
+              <a:rPr lang="en-US" sz="2400" dirty="0"/>
+              <a:t> and another that executes if the condition is </a:t>
+            </a:r>
+            <a:r>
+              <a:rPr lang="en-US" sz="2400" b="1" dirty="0"/>
+              <a:t>false</a:t>
+            </a:r>
+            <a:r>
+              <a:rPr lang="en-US" sz="2400" dirty="0"/>
+              <a:t>.</a:t>
             </a:r>
           </a:p>
           <a:p>
@@ -17052,8 +17108,8 @@
         </p:nvSpPr>
         <p:spPr>
           <a:xfrm>
-            <a:off x="645066" y="2031101"/>
-            <a:ext cx="4741494" cy="3511943"/>
+            <a:off x="501981" y="1022209"/>
+            <a:ext cx="5028051" cy="3511943"/>
           </a:xfrm>
         </p:spPr>
         <p:txBody>
@@ -17068,42 +17124,64 @@
             <a:r>
               <a:rPr lang="en-IN" sz="2400" b="1" dirty="0">
                 <a:solidFill>
+                  <a:schemeClr val="accent6">
+                    <a:lumMod val="50000"/>
+                  </a:schemeClr>
+                </a:solidFill>
+              </a:rPr>
+              <a:t>3. if-else-if ladder</a:t>
+            </a:r>
+            <a:r>
+              <a:rPr lang="en-IN" sz="2400" dirty="0">
+                <a:solidFill>
+                  <a:schemeClr val="accent6">
+                    <a:lumMod val="50000"/>
+                  </a:schemeClr>
+                </a:solidFill>
+              </a:rPr>
+              <a:t>:</a:t>
+            </a:r>
+          </a:p>
+          <a:p>
+            <a:pPr marL="0" indent="0">
+              <a:buNone/>
+            </a:pPr>
+            <a:r>
+              <a:rPr lang="en-US" sz="2000" dirty="0"/>
+              <a:t>The if-else-if ladder allows for </a:t>
+            </a:r>
+            <a:r>
+              <a:rPr lang="en-US" sz="2000" b="1" dirty="0"/>
+              <a:t>multiple conditions</a:t>
+            </a:r>
+            <a:r>
+              <a:rPr lang="en-US" sz="2000" dirty="0"/>
+              <a:t> to be evaluated </a:t>
+            </a:r>
+            <a:r>
+              <a:rPr lang="en-US" sz="2000" b="1" dirty="0">
+                <a:solidFill>
                   <a:srgbClr val="C00000"/>
                 </a:solidFill>
               </a:rPr>
-              <a:t>3. if-else-if ladder</a:t>
-            </a:r>
-            <a:r>
-              <a:rPr lang="en-IN" sz="2400" dirty="0">
+              <a:t>sequentially</a:t>
+            </a:r>
+            <a:r>
+              <a:rPr lang="en-US" sz="2000" dirty="0"/>
+              <a:t>. The first condition that evaluates to true will have its corresponding block executed, and the rest of the ladder will be skipped. If none of the conditions are true, the </a:t>
+            </a:r>
+            <a:r>
+              <a:rPr lang="en-US" sz="2000" b="1" dirty="0">
                 <a:solidFill>
                   <a:srgbClr val="C00000"/>
                 </a:solidFill>
               </a:rPr>
-              <a:t>:</a:t>
-            </a:r>
-          </a:p>
-          <a:p>
-            <a:pPr marL="0" indent="0">
-              <a:buNone/>
-            </a:pPr>
+              <a:t>else</a:t>
+            </a:r>
             <a:r>
               <a:rPr lang="en-US" sz="2000" dirty="0"/>
-              <a:t>The if-else-if ladder allows for multiple conditions to be evaluated sequentially. The first condition that evaluates to true will have its corresponding block executed, and the rest of the ladder will be skipped. If none of the conditions are true, the else block (if present) will be executed.</a:t>
-            </a:r>
-          </a:p>
-          <a:p>
-            <a:pPr marL="0" indent="0">
-              <a:buNone/>
-            </a:pPr>
-            <a:r>
-              <a:rPr lang="en-US" sz="1800" b="1" dirty="0"/>
-              <a:t>Syntax:</a:t>
-            </a:r>
-          </a:p>
-          <a:p>
-            <a:pPr marL="0" indent="0">
-              <a:buNone/>
-            </a:pPr>
+              <a:t> block (if present) will be executed.</a:t>
+            </a:r>
             <a:endParaRPr lang="en-IN" sz="1800" b="1" dirty="0"/>
           </a:p>
         </p:txBody>
@@ -17332,7 +17410,7 @@
         </p:blipFill>
         <p:spPr>
           <a:xfrm>
-            <a:off x="5796042" y="1933700"/>
+            <a:off x="5879422" y="1306645"/>
             <a:ext cx="5819714" cy="2851660"/>
           </a:xfrm>
           <a:prstGeom prst="rect">
@@ -17599,7 +17677,7 @@
         </p:blipFill>
         <p:spPr>
           <a:xfrm>
-            <a:off x="1317861" y="162560"/>
+            <a:off x="1317861" y="310044"/>
             <a:ext cx="9196782" cy="4069575"/>
           </a:xfrm>
           <a:prstGeom prst="rect">
@@ -17782,27 +17860,55 @@
             <a:r>
               <a:rPr lang="en-IN" b="1" dirty="0">
                 <a:solidFill>
+                  <a:schemeClr val="accent6">
+                    <a:lumMod val="50000"/>
+                  </a:schemeClr>
+                </a:solidFill>
+              </a:rPr>
+              <a:t>4. Nested if statement</a:t>
+            </a:r>
+            <a:r>
+              <a:rPr lang="en-IN" dirty="0">
+                <a:solidFill>
+                  <a:schemeClr val="accent6">
+                    <a:lumMod val="50000"/>
+                  </a:schemeClr>
+                </a:solidFill>
+              </a:rPr>
+              <a:t>:</a:t>
+            </a:r>
+          </a:p>
+          <a:p>
+            <a:pPr marL="0" indent="0">
+              <a:buNone/>
+            </a:pPr>
+            <a:r>
+              <a:rPr lang="en-US" sz="2400" dirty="0"/>
+              <a:t>Nested if statements allow an </a:t>
+            </a:r>
+            <a:r>
+              <a:rPr lang="en-US" sz="2400" b="1" dirty="0">
+                <a:solidFill>
                   <a:srgbClr val="C00000"/>
                 </a:solidFill>
               </a:rPr>
-              <a:t>4. Nested if statement</a:t>
-            </a:r>
-            <a:r>
-              <a:rPr lang="en-IN" dirty="0">
+              <a:t>if statement </a:t>
+            </a:r>
+            <a:r>
+              <a:rPr lang="en-US" sz="2400" dirty="0"/>
+              <a:t>to be placed </a:t>
+            </a:r>
+            <a:r>
+              <a:rPr lang="en-US" sz="2400" b="1" dirty="0">
                 <a:solidFill>
                   <a:srgbClr val="C00000"/>
                 </a:solidFill>
               </a:rPr>
-              <a:t>:</a:t>
-            </a:r>
-          </a:p>
-          <a:p>
-            <a:pPr marL="0" indent="0">
-              <a:buNone/>
-            </a:pPr>
+              <a:t>inside another if statement</a:t>
+            </a:r>
             <a:r>
               <a:rPr lang="en-US" sz="2400" dirty="0"/>
-              <a:t>Nested if statements allow an if statement to be placed inside another if statement. This allows for </a:t>
+              <a:t>. This allows for </a:t>
             </a:r>
             <a:r>
               <a:rPr lang="en-US" sz="2400" b="1" dirty="0"/>
@@ -18197,27 +18303,75 @@
             <a:r>
               <a:rPr lang="en-US" b="1" dirty="0">
                 <a:solidFill>
+                  <a:schemeClr val="accent6">
+                    <a:lumMod val="50000"/>
+                  </a:schemeClr>
+                </a:solidFill>
+              </a:rPr>
+              <a:t>5. </a:t>
+            </a:r>
+            <a:r>
+              <a:rPr lang="en-IN" b="1" dirty="0">
+                <a:solidFill>
+                  <a:schemeClr val="accent6">
+                    <a:lumMod val="50000"/>
+                  </a:schemeClr>
+                </a:solidFill>
+              </a:rPr>
+              <a:t>Switch statement:</a:t>
+            </a:r>
+          </a:p>
+          <a:p>
+            <a:pPr marL="0" indent="0">
+              <a:buNone/>
+            </a:pPr>
+            <a:r>
+              <a:rPr lang="en-US" sz="2400" dirty="0"/>
+              <a:t>The switch statement evaluates an expression and compares it to a </a:t>
+            </a:r>
+            <a:r>
+              <a:rPr lang="en-US" sz="2400" b="1" dirty="0">
+                <a:solidFill>
                   <a:srgbClr val="C00000"/>
                 </a:solidFill>
               </a:rPr>
-              <a:t>5. </a:t>
-            </a:r>
-            <a:r>
-              <a:rPr lang="en-IN" b="1" dirty="0">
+              <a:t>list of case</a:t>
+            </a:r>
+            <a:r>
+              <a:rPr lang="en-US" sz="2400" dirty="0">
                 <a:solidFill>
                   <a:srgbClr val="C00000"/>
                 </a:solidFill>
               </a:rPr>
-              <a:t>Switch statement:</a:t>
-            </a:r>
-          </a:p>
-          <a:p>
-            <a:pPr marL="0" indent="0">
-              <a:buNone/>
-            </a:pPr>
+              <a:t> </a:t>
+            </a:r>
             <a:r>
               <a:rPr lang="en-US" sz="2400" dirty="0"/>
-              <a:t>The switch statement evaluates an expression and compares it to a list of case values. When a match is found, the corresponding block of code is executed. The break statement is used to exit the switch block after the matched case has been executed. If no match is found, the default block (if present) is executed. The switch statement is often used as an alternative to the if-else-if ladder for better readability and performance when dealing with multiple possible values of an expression.</a:t>
+              <a:t>values. When a match is found, the corresponding block of code is executed. The </a:t>
+            </a:r>
+            <a:r>
+              <a:rPr lang="en-US" sz="2400" b="1" dirty="0">
+                <a:solidFill>
+                  <a:srgbClr val="C00000"/>
+                </a:solidFill>
+              </a:rPr>
+              <a:t>break</a:t>
+            </a:r>
+            <a:r>
+              <a:rPr lang="en-US" sz="2400" dirty="0"/>
+              <a:t> statement is used to exit the switch block after the matched case has been executed. If no match is found, the default block (if present) is executed. The switch statement is often used as an alternative to the </a:t>
+            </a:r>
+            <a:r>
+              <a:rPr lang="en-US" sz="2400" b="1" dirty="0">
+                <a:solidFill>
+                  <a:srgbClr val="C00000"/>
+                </a:solidFill>
+              </a:rPr>
+              <a:t>if-else-if ladder </a:t>
+            </a:r>
+            <a:r>
+              <a:rPr lang="en-US" sz="2400" dirty="0"/>
+              <a:t>for better readability and performance when dealing with multiple possible values of an expression.</a:t>
             </a:r>
           </a:p>
           <a:p>
@@ -19355,7 +19509,11 @@
               <a:buNone/>
             </a:pPr>
             <a:r>
-              <a:rPr lang="en-US" sz="2400" b="1" dirty="0"/>
+              <a:rPr lang="en-US" sz="2400" b="1" dirty="0">
+                <a:solidFill>
+                  <a:srgbClr val="002060"/>
+                </a:solidFill>
+              </a:rPr>
               <a:t>2. while loop:</a:t>
             </a:r>
           </a:p>
@@ -19993,7 +20151,7 @@
         </p:nvSpPr>
         <p:spPr>
           <a:xfrm>
-            <a:off x="588931" y="1291241"/>
+            <a:off x="588932" y="1420214"/>
             <a:ext cx="5599217" cy="3979585"/>
           </a:xfrm>
         </p:spPr>
@@ -20007,7 +20165,11 @@
               <a:buNone/>
             </a:pPr>
             <a:r>
-              <a:rPr lang="en-US" sz="2400" b="1" dirty="0"/>
+              <a:rPr lang="en-US" sz="2400" b="1" dirty="0">
+                <a:solidFill>
+                  <a:srgbClr val="002060"/>
+                </a:solidFill>
+              </a:rPr>
               <a:t>3. do-while loop:</a:t>
             </a:r>
           </a:p>

</xml_diff>